<commit_message>
removed placeholder and added a slide
</commit_message>
<xml_diff>
--- a/presentation/ResponsiveWebDesign.pptx
+++ b/presentation/ResponsiveWebDesign.pptx
@@ -6,6 +6,7 @@
   </p:sldMasterIdLst>
   <p:sldIdLst>
     <p:sldId id="256" r:id="rId2"/>
+    <p:sldId id="257" r:id="rId3"/>
   </p:sldIdLst>
   <p:sldSz cx="12192000" cy="6858000"/>
   <p:notesSz cx="6858000" cy="9144000"/>
@@ -238,7 +239,8 @@
           <a:p>
             <a:fld id="{57B3EDBD-9D3B-4136-9D70-FC66C9D4D47F}" type="datetimeFigureOut">
               <a:rPr lang="en-US" smtClean="0"/>
-              <a:t>10/6/2014</a:t>
+              <a:pPr/>
+              <a:t>10/7/2014</a:t>
             </a:fld>
             <a:endParaRPr lang="en-US"/>
           </a:p>
@@ -280,6 +282,7 @@
           <a:p>
             <a:fld id="{8BBD1F59-0DAF-4CE3-BBA6-285804353DFB}" type="slidenum">
               <a:rPr lang="en-US" smtClean="0"/>
+              <a:pPr/>
               <a:t>‹#›</a:t>
             </a:fld>
             <a:endParaRPr lang="en-US"/>
@@ -289,7 +292,7 @@
     </p:spTree>
     <p:extLst>
       <p:ext uri="{BB962C8B-B14F-4D97-AF65-F5344CB8AC3E}">
-        <p14:creationId xmlns:p14="http://schemas.microsoft.com/office/powerpoint/2010/main" val="603690990"/>
+        <p14:creationId xmlns:p14="http://schemas.microsoft.com/office/powerpoint/2010/main" xmlns="" val="603690990"/>
       </p:ext>
     </p:extLst>
   </p:cSld>
@@ -408,7 +411,8 @@
           <a:p>
             <a:fld id="{57B3EDBD-9D3B-4136-9D70-FC66C9D4D47F}" type="datetimeFigureOut">
               <a:rPr lang="en-US" smtClean="0"/>
-              <a:t>10/6/2014</a:t>
+              <a:pPr/>
+              <a:t>10/7/2014</a:t>
             </a:fld>
             <a:endParaRPr lang="en-US"/>
           </a:p>
@@ -450,6 +454,7 @@
           <a:p>
             <a:fld id="{8BBD1F59-0DAF-4CE3-BBA6-285804353DFB}" type="slidenum">
               <a:rPr lang="en-US" smtClean="0"/>
+              <a:pPr/>
               <a:t>‹#›</a:t>
             </a:fld>
             <a:endParaRPr lang="en-US"/>
@@ -459,7 +464,7 @@
     </p:spTree>
     <p:extLst>
       <p:ext uri="{BB962C8B-B14F-4D97-AF65-F5344CB8AC3E}">
-        <p14:creationId xmlns:p14="http://schemas.microsoft.com/office/powerpoint/2010/main" val="289908853"/>
+        <p14:creationId xmlns:p14="http://schemas.microsoft.com/office/powerpoint/2010/main" xmlns="" val="289908853"/>
       </p:ext>
     </p:extLst>
   </p:cSld>
@@ -588,7 +593,8 @@
           <a:p>
             <a:fld id="{57B3EDBD-9D3B-4136-9D70-FC66C9D4D47F}" type="datetimeFigureOut">
               <a:rPr lang="en-US" smtClean="0"/>
-              <a:t>10/6/2014</a:t>
+              <a:pPr/>
+              <a:t>10/7/2014</a:t>
             </a:fld>
             <a:endParaRPr lang="en-US"/>
           </a:p>
@@ -630,6 +636,7 @@
           <a:p>
             <a:fld id="{8BBD1F59-0DAF-4CE3-BBA6-285804353DFB}" type="slidenum">
               <a:rPr lang="en-US" smtClean="0"/>
+              <a:pPr/>
               <a:t>‹#›</a:t>
             </a:fld>
             <a:endParaRPr lang="en-US"/>
@@ -639,7 +646,7 @@
     </p:spTree>
     <p:extLst>
       <p:ext uri="{BB962C8B-B14F-4D97-AF65-F5344CB8AC3E}">
-        <p14:creationId xmlns:p14="http://schemas.microsoft.com/office/powerpoint/2010/main" val="192542277"/>
+        <p14:creationId xmlns:p14="http://schemas.microsoft.com/office/powerpoint/2010/main" xmlns="" val="192542277"/>
       </p:ext>
     </p:extLst>
   </p:cSld>
@@ -758,7 +765,8 @@
           <a:p>
             <a:fld id="{57B3EDBD-9D3B-4136-9D70-FC66C9D4D47F}" type="datetimeFigureOut">
               <a:rPr lang="en-US" smtClean="0"/>
-              <a:t>10/6/2014</a:t>
+              <a:pPr/>
+              <a:t>10/7/2014</a:t>
             </a:fld>
             <a:endParaRPr lang="en-US"/>
           </a:p>
@@ -800,6 +808,7 @@
           <a:p>
             <a:fld id="{8BBD1F59-0DAF-4CE3-BBA6-285804353DFB}" type="slidenum">
               <a:rPr lang="en-US" smtClean="0"/>
+              <a:pPr/>
               <a:t>‹#›</a:t>
             </a:fld>
             <a:endParaRPr lang="en-US"/>
@@ -809,7 +818,7 @@
     </p:spTree>
     <p:extLst>
       <p:ext uri="{BB962C8B-B14F-4D97-AF65-F5344CB8AC3E}">
-        <p14:creationId xmlns:p14="http://schemas.microsoft.com/office/powerpoint/2010/main" val="2085885461"/>
+        <p14:creationId xmlns:p14="http://schemas.microsoft.com/office/powerpoint/2010/main" xmlns="" val="2085885461"/>
       </p:ext>
     </p:extLst>
   </p:cSld>
@@ -1004,7 +1013,8 @@
           <a:p>
             <a:fld id="{57B3EDBD-9D3B-4136-9D70-FC66C9D4D47F}" type="datetimeFigureOut">
               <a:rPr lang="en-US" smtClean="0"/>
-              <a:t>10/6/2014</a:t>
+              <a:pPr/>
+              <a:t>10/7/2014</a:t>
             </a:fld>
             <a:endParaRPr lang="en-US"/>
           </a:p>
@@ -1046,6 +1056,7 @@
           <a:p>
             <a:fld id="{8BBD1F59-0DAF-4CE3-BBA6-285804353DFB}" type="slidenum">
               <a:rPr lang="en-US" smtClean="0"/>
+              <a:pPr/>
               <a:t>‹#›</a:t>
             </a:fld>
             <a:endParaRPr lang="en-US"/>
@@ -1055,7 +1066,7 @@
     </p:spTree>
     <p:extLst>
       <p:ext uri="{BB962C8B-B14F-4D97-AF65-F5344CB8AC3E}">
-        <p14:creationId xmlns:p14="http://schemas.microsoft.com/office/powerpoint/2010/main" val="3778703531"/>
+        <p14:creationId xmlns:p14="http://schemas.microsoft.com/office/powerpoint/2010/main" xmlns="" val="3778703531"/>
       </p:ext>
     </p:extLst>
   </p:cSld>
@@ -1236,7 +1247,8 @@
           <a:p>
             <a:fld id="{57B3EDBD-9D3B-4136-9D70-FC66C9D4D47F}" type="datetimeFigureOut">
               <a:rPr lang="en-US" smtClean="0"/>
-              <a:t>10/6/2014</a:t>
+              <a:pPr/>
+              <a:t>10/7/2014</a:t>
             </a:fld>
             <a:endParaRPr lang="en-US"/>
           </a:p>
@@ -1278,6 +1290,7 @@
           <a:p>
             <a:fld id="{8BBD1F59-0DAF-4CE3-BBA6-285804353DFB}" type="slidenum">
               <a:rPr lang="en-US" smtClean="0"/>
+              <a:pPr/>
               <a:t>‹#›</a:t>
             </a:fld>
             <a:endParaRPr lang="en-US"/>
@@ -1287,7 +1300,7 @@
     </p:spTree>
     <p:extLst>
       <p:ext uri="{BB962C8B-B14F-4D97-AF65-F5344CB8AC3E}">
-        <p14:creationId xmlns:p14="http://schemas.microsoft.com/office/powerpoint/2010/main" val="1931434740"/>
+        <p14:creationId xmlns:p14="http://schemas.microsoft.com/office/powerpoint/2010/main" xmlns="" val="1931434740"/>
       </p:ext>
     </p:extLst>
   </p:cSld>
@@ -1603,7 +1616,8 @@
           <a:p>
             <a:fld id="{57B3EDBD-9D3B-4136-9D70-FC66C9D4D47F}" type="datetimeFigureOut">
               <a:rPr lang="en-US" smtClean="0"/>
-              <a:t>10/6/2014</a:t>
+              <a:pPr/>
+              <a:t>10/7/2014</a:t>
             </a:fld>
             <a:endParaRPr lang="en-US"/>
           </a:p>
@@ -1645,6 +1659,7 @@
           <a:p>
             <a:fld id="{8BBD1F59-0DAF-4CE3-BBA6-285804353DFB}" type="slidenum">
               <a:rPr lang="en-US" smtClean="0"/>
+              <a:pPr/>
               <a:t>‹#›</a:t>
             </a:fld>
             <a:endParaRPr lang="en-US"/>
@@ -1654,7 +1669,7 @@
     </p:spTree>
     <p:extLst>
       <p:ext uri="{BB962C8B-B14F-4D97-AF65-F5344CB8AC3E}">
-        <p14:creationId xmlns:p14="http://schemas.microsoft.com/office/powerpoint/2010/main" val="1296646791"/>
+        <p14:creationId xmlns:p14="http://schemas.microsoft.com/office/powerpoint/2010/main" xmlns="" val="1296646791"/>
       </p:ext>
     </p:extLst>
   </p:cSld>
@@ -1721,7 +1736,8 @@
           <a:p>
             <a:fld id="{57B3EDBD-9D3B-4136-9D70-FC66C9D4D47F}" type="datetimeFigureOut">
               <a:rPr lang="en-US" smtClean="0"/>
-              <a:t>10/6/2014</a:t>
+              <a:pPr/>
+              <a:t>10/7/2014</a:t>
             </a:fld>
             <a:endParaRPr lang="en-US"/>
           </a:p>
@@ -1763,6 +1779,7 @@
           <a:p>
             <a:fld id="{8BBD1F59-0DAF-4CE3-BBA6-285804353DFB}" type="slidenum">
               <a:rPr lang="en-US" smtClean="0"/>
+              <a:pPr/>
               <a:t>‹#›</a:t>
             </a:fld>
             <a:endParaRPr lang="en-US"/>
@@ -1772,7 +1789,7 @@
     </p:spTree>
     <p:extLst>
       <p:ext uri="{BB962C8B-B14F-4D97-AF65-F5344CB8AC3E}">
-        <p14:creationId xmlns:p14="http://schemas.microsoft.com/office/powerpoint/2010/main" val="556185585"/>
+        <p14:creationId xmlns:p14="http://schemas.microsoft.com/office/powerpoint/2010/main" xmlns="" val="556185585"/>
       </p:ext>
     </p:extLst>
   </p:cSld>
@@ -1816,7 +1833,8 @@
           <a:p>
             <a:fld id="{57B3EDBD-9D3B-4136-9D70-FC66C9D4D47F}" type="datetimeFigureOut">
               <a:rPr lang="en-US" smtClean="0"/>
-              <a:t>10/6/2014</a:t>
+              <a:pPr/>
+              <a:t>10/7/2014</a:t>
             </a:fld>
             <a:endParaRPr lang="en-US"/>
           </a:p>
@@ -1858,6 +1876,7 @@
           <a:p>
             <a:fld id="{8BBD1F59-0DAF-4CE3-BBA6-285804353DFB}" type="slidenum">
               <a:rPr lang="en-US" smtClean="0"/>
+              <a:pPr/>
               <a:t>‹#›</a:t>
             </a:fld>
             <a:endParaRPr lang="en-US"/>
@@ -1867,7 +1886,7 @@
     </p:spTree>
     <p:extLst>
       <p:ext uri="{BB962C8B-B14F-4D97-AF65-F5344CB8AC3E}">
-        <p14:creationId xmlns:p14="http://schemas.microsoft.com/office/powerpoint/2010/main" val="2428574185"/>
+        <p14:creationId xmlns:p14="http://schemas.microsoft.com/office/powerpoint/2010/main" xmlns="" val="2428574185"/>
       </p:ext>
     </p:extLst>
   </p:cSld>
@@ -2093,7 +2112,8 @@
           <a:p>
             <a:fld id="{57B3EDBD-9D3B-4136-9D70-FC66C9D4D47F}" type="datetimeFigureOut">
               <a:rPr lang="en-US" smtClean="0"/>
-              <a:t>10/6/2014</a:t>
+              <a:pPr/>
+              <a:t>10/7/2014</a:t>
             </a:fld>
             <a:endParaRPr lang="en-US"/>
           </a:p>
@@ -2135,6 +2155,7 @@
           <a:p>
             <a:fld id="{8BBD1F59-0DAF-4CE3-BBA6-285804353DFB}" type="slidenum">
               <a:rPr lang="en-US" smtClean="0"/>
+              <a:pPr/>
               <a:t>‹#›</a:t>
             </a:fld>
             <a:endParaRPr lang="en-US"/>
@@ -2144,7 +2165,7 @@
     </p:spTree>
     <p:extLst>
       <p:ext uri="{BB962C8B-B14F-4D97-AF65-F5344CB8AC3E}">
-        <p14:creationId xmlns:p14="http://schemas.microsoft.com/office/powerpoint/2010/main" val="4228434209"/>
+        <p14:creationId xmlns:p14="http://schemas.microsoft.com/office/powerpoint/2010/main" xmlns="" val="4228434209"/>
       </p:ext>
     </p:extLst>
   </p:cSld>
@@ -2346,7 +2367,8 @@
           <a:p>
             <a:fld id="{57B3EDBD-9D3B-4136-9D70-FC66C9D4D47F}" type="datetimeFigureOut">
               <a:rPr lang="en-US" smtClean="0"/>
-              <a:t>10/6/2014</a:t>
+              <a:pPr/>
+              <a:t>10/7/2014</a:t>
             </a:fld>
             <a:endParaRPr lang="en-US"/>
           </a:p>
@@ -2388,6 +2410,7 @@
           <a:p>
             <a:fld id="{8BBD1F59-0DAF-4CE3-BBA6-285804353DFB}" type="slidenum">
               <a:rPr lang="en-US" smtClean="0"/>
+              <a:pPr/>
               <a:t>‹#›</a:t>
             </a:fld>
             <a:endParaRPr lang="en-US"/>
@@ -2397,7 +2420,7 @@
     </p:spTree>
     <p:extLst>
       <p:ext uri="{BB962C8B-B14F-4D97-AF65-F5344CB8AC3E}">
-        <p14:creationId xmlns:p14="http://schemas.microsoft.com/office/powerpoint/2010/main" val="3446978262"/>
+        <p14:creationId xmlns:p14="http://schemas.microsoft.com/office/powerpoint/2010/main" xmlns="" val="3446978262"/>
       </p:ext>
     </p:extLst>
   </p:cSld>
@@ -2559,7 +2582,8 @@
           <a:p>
             <a:fld id="{57B3EDBD-9D3B-4136-9D70-FC66C9D4D47F}" type="datetimeFigureOut">
               <a:rPr lang="en-US" smtClean="0"/>
-              <a:t>10/6/2014</a:t>
+              <a:pPr/>
+              <a:t>10/7/2014</a:t>
             </a:fld>
             <a:endParaRPr lang="en-US"/>
           </a:p>
@@ -2637,6 +2661,7 @@
           <a:p>
             <a:fld id="{8BBD1F59-0DAF-4CE3-BBA6-285804353DFB}" type="slidenum">
               <a:rPr lang="en-US" smtClean="0"/>
+              <a:pPr/>
               <a:t>‹#›</a:t>
             </a:fld>
             <a:endParaRPr lang="en-US"/>
@@ -2646,7 +2671,7 @@
     </p:spTree>
     <p:extLst>
       <p:ext uri="{BB962C8B-B14F-4D97-AF65-F5344CB8AC3E}">
-        <p14:creationId xmlns:p14="http://schemas.microsoft.com/office/powerpoint/2010/main" val="521963650"/>
+        <p14:creationId xmlns:p14="http://schemas.microsoft.com/office/powerpoint/2010/main" xmlns="" val="521963650"/>
       </p:ext>
     </p:extLst>
   </p:cSld>
@@ -3009,9 +3034,80 @@
     </p:spTree>
     <p:extLst>
       <p:ext uri="{BB962C8B-B14F-4D97-AF65-F5344CB8AC3E}">
-        <p14:creationId xmlns:p14="http://schemas.microsoft.com/office/powerpoint/2010/main" val="3182996200"/>
+        <p14:creationId xmlns:p14="http://schemas.microsoft.com/office/powerpoint/2010/main" xmlns="" val="3182996200"/>
       </p:ext>
     </p:extLst>
+  </p:cSld>
+  <p:clrMapOvr>
+    <a:masterClrMapping/>
+  </p:clrMapOvr>
+</p:sld>
+</file>
+
+<file path=ppt/slides/slide2.xml><?xml version="1.0" encoding="utf-8"?>
+<p:sld xmlns:a="http://schemas.openxmlformats.org/drawingml/2006/main" xmlns:r="http://schemas.openxmlformats.org/officeDocument/2006/relationships" xmlns:p="http://schemas.openxmlformats.org/presentationml/2006/main">
+  <p:cSld>
+    <p:spTree>
+      <p:nvGrpSpPr>
+        <p:cNvPr id="1" name=""/>
+        <p:cNvGrpSpPr/>
+        <p:nvPr/>
+      </p:nvGrpSpPr>
+      <p:grpSpPr>
+        <a:xfrm>
+          <a:off x="0" y="0"/>
+          <a:ext cx="0" cy="0"/>
+          <a:chOff x="0" y="0"/>
+          <a:chExt cx="0" cy="0"/>
+        </a:xfrm>
+      </p:grpSpPr>
+      <p:sp>
+        <p:nvSpPr>
+          <p:cNvPr id="2" name="Title 1"/>
+          <p:cNvSpPr>
+            <a:spLocks noGrp="1"/>
+          </p:cNvSpPr>
+          <p:nvPr>
+            <p:ph type="title"/>
+          </p:nvPr>
+        </p:nvSpPr>
+        <p:spPr/>
+        <p:txBody>
+          <a:bodyPr/>
+          <a:lstStyle/>
+          <a:p>
+            <a:r>
+              <a:rPr lang="en-US" dirty="0" smtClean="0"/>
+              <a:t>Mark’s </a:t>
+            </a:r>
+            <a:r>
+              <a:rPr lang="en-US" smtClean="0"/>
+              <a:t>Second Slide</a:t>
+            </a:r>
+            <a:endParaRPr lang="en-US"/>
+          </a:p>
+        </p:txBody>
+      </p:sp>
+      <p:sp>
+        <p:nvSpPr>
+          <p:cNvPr id="3" name="Content Placeholder 2"/>
+          <p:cNvSpPr>
+            <a:spLocks noGrp="1"/>
+          </p:cNvSpPr>
+          <p:nvPr>
+            <p:ph idx="1"/>
+          </p:nvPr>
+        </p:nvSpPr>
+        <p:spPr/>
+        <p:txBody>
+          <a:bodyPr/>
+          <a:lstStyle/>
+          <a:p>
+            <a:endParaRPr lang="en-US"/>
+          </a:p>
+        </p:txBody>
+      </p:sp>
+    </p:spTree>
   </p:cSld>
   <p:clrMapOvr>
     <a:masterClrMapping/>
@@ -3062,7 +3158,7 @@
     </a:clrScheme>
     <a:fontScheme name="Office">
       <a:majorFont>
-        <a:latin typeface="Calibri Light" panose="020F0302020204030204"/>
+        <a:latin typeface="Calibri Light"/>
         <a:ea typeface=""/>
         <a:cs typeface=""/>
         <a:font script="Jpan" typeface="ＭＳ Ｐゴシック"/>
@@ -3097,7 +3193,7 @@
         <a:font script="Geor" typeface="Sylfaen"/>
       </a:majorFont>
       <a:minorFont>
-        <a:latin typeface="Calibri" panose="020F0502020204030204"/>
+        <a:latin typeface="Calibri"/>
         <a:ea typeface=""/>
         <a:cs typeface=""/>
         <a:font script="Jpan" typeface="ＭＳ Ｐゴシック"/>
@@ -3274,7 +3370,7 @@
   <a:extraClrSchemeLst/>
   <a:extLst>
     <a:ext uri="{05A4C25C-085E-4340-85A3-A5531E510DB2}">
-      <thm15:themeFamily xmlns:thm15="http://schemas.microsoft.com/office/thememl/2012/main" name="Office Theme" id="{62F939B6-93AF-4DB8-9C6B-D6C7DFDC589F}" vid="{4A3C46E8-61CC-4603-A589-7422A47A8E4A}"/>
+      <thm15:themeFamily xmlns:thm15="http://schemas.microsoft.com/office/thememl/2012/main" xmlns="" name="Office Theme" id="{62F939B6-93AF-4DB8-9C6B-D6C7DFDC589F}" vid="{4A3C46E8-61CC-4603-A589-7422A47A8E4A}"/>
     </a:ext>
   </a:extLst>
 </a:theme>

</xml_diff>

<commit_message>
removed stub slides and added two content slides
</commit_message>
<xml_diff>
--- a/presentation/ResponsiveWebDesign.pptx
+++ b/presentation/ResponsiveWebDesign.pptx
@@ -5,8 +5,8 @@
     <p:sldMasterId id="2147483648" r:id="rId1"/>
   </p:sldMasterIdLst>
   <p:sldIdLst>
-    <p:sldId id="256" r:id="rId2"/>
-    <p:sldId id="257" r:id="rId3"/>
+    <p:sldId id="257" r:id="rId2"/>
+    <p:sldId id="258" r:id="rId3"/>
   </p:sldIdLst>
   <p:sldSz cx="12192000" cy="6858000"/>
   <p:notesSz cx="6858000" cy="9144000"/>
@@ -240,7 +240,7 @@
             <a:fld id="{57B3EDBD-9D3B-4136-9D70-FC66C9D4D47F}" type="datetimeFigureOut">
               <a:rPr lang="en-US" smtClean="0"/>
               <a:pPr/>
-              <a:t>10/7/2014</a:t>
+              <a:t>10/9/2014</a:t>
             </a:fld>
             <a:endParaRPr lang="en-US"/>
           </a:p>
@@ -292,7 +292,7 @@
     </p:spTree>
     <p:extLst>
       <p:ext uri="{BB962C8B-B14F-4D97-AF65-F5344CB8AC3E}">
-        <p14:creationId xmlns:p14="http://schemas.microsoft.com/office/powerpoint/2010/main" xmlns="" val="603690990"/>
+        <p14:creationId xmlns="" xmlns:p14="http://schemas.microsoft.com/office/powerpoint/2010/main" val="603690990"/>
       </p:ext>
     </p:extLst>
   </p:cSld>
@@ -412,7 +412,7 @@
             <a:fld id="{57B3EDBD-9D3B-4136-9D70-FC66C9D4D47F}" type="datetimeFigureOut">
               <a:rPr lang="en-US" smtClean="0"/>
               <a:pPr/>
-              <a:t>10/7/2014</a:t>
+              <a:t>10/9/2014</a:t>
             </a:fld>
             <a:endParaRPr lang="en-US"/>
           </a:p>
@@ -464,7 +464,7 @@
     </p:spTree>
     <p:extLst>
       <p:ext uri="{BB962C8B-B14F-4D97-AF65-F5344CB8AC3E}">
-        <p14:creationId xmlns:p14="http://schemas.microsoft.com/office/powerpoint/2010/main" xmlns="" val="289908853"/>
+        <p14:creationId xmlns="" xmlns:p14="http://schemas.microsoft.com/office/powerpoint/2010/main" val="289908853"/>
       </p:ext>
     </p:extLst>
   </p:cSld>
@@ -594,7 +594,7 @@
             <a:fld id="{57B3EDBD-9D3B-4136-9D70-FC66C9D4D47F}" type="datetimeFigureOut">
               <a:rPr lang="en-US" smtClean="0"/>
               <a:pPr/>
-              <a:t>10/7/2014</a:t>
+              <a:t>10/9/2014</a:t>
             </a:fld>
             <a:endParaRPr lang="en-US"/>
           </a:p>
@@ -646,7 +646,7 @@
     </p:spTree>
     <p:extLst>
       <p:ext uri="{BB962C8B-B14F-4D97-AF65-F5344CB8AC3E}">
-        <p14:creationId xmlns:p14="http://schemas.microsoft.com/office/powerpoint/2010/main" xmlns="" val="192542277"/>
+        <p14:creationId xmlns="" xmlns:p14="http://schemas.microsoft.com/office/powerpoint/2010/main" val="192542277"/>
       </p:ext>
     </p:extLst>
   </p:cSld>
@@ -766,7 +766,7 @@
             <a:fld id="{57B3EDBD-9D3B-4136-9D70-FC66C9D4D47F}" type="datetimeFigureOut">
               <a:rPr lang="en-US" smtClean="0"/>
               <a:pPr/>
-              <a:t>10/7/2014</a:t>
+              <a:t>10/9/2014</a:t>
             </a:fld>
             <a:endParaRPr lang="en-US"/>
           </a:p>
@@ -818,7 +818,7 @@
     </p:spTree>
     <p:extLst>
       <p:ext uri="{BB962C8B-B14F-4D97-AF65-F5344CB8AC3E}">
-        <p14:creationId xmlns:p14="http://schemas.microsoft.com/office/powerpoint/2010/main" xmlns="" val="2085885461"/>
+        <p14:creationId xmlns="" xmlns:p14="http://schemas.microsoft.com/office/powerpoint/2010/main" val="2085885461"/>
       </p:ext>
     </p:extLst>
   </p:cSld>
@@ -1014,7 +1014,7 @@
             <a:fld id="{57B3EDBD-9D3B-4136-9D70-FC66C9D4D47F}" type="datetimeFigureOut">
               <a:rPr lang="en-US" smtClean="0"/>
               <a:pPr/>
-              <a:t>10/7/2014</a:t>
+              <a:t>10/9/2014</a:t>
             </a:fld>
             <a:endParaRPr lang="en-US"/>
           </a:p>
@@ -1066,7 +1066,7 @@
     </p:spTree>
     <p:extLst>
       <p:ext uri="{BB962C8B-B14F-4D97-AF65-F5344CB8AC3E}">
-        <p14:creationId xmlns:p14="http://schemas.microsoft.com/office/powerpoint/2010/main" xmlns="" val="3778703531"/>
+        <p14:creationId xmlns="" xmlns:p14="http://schemas.microsoft.com/office/powerpoint/2010/main" val="3778703531"/>
       </p:ext>
     </p:extLst>
   </p:cSld>
@@ -1248,7 +1248,7 @@
             <a:fld id="{57B3EDBD-9D3B-4136-9D70-FC66C9D4D47F}" type="datetimeFigureOut">
               <a:rPr lang="en-US" smtClean="0"/>
               <a:pPr/>
-              <a:t>10/7/2014</a:t>
+              <a:t>10/9/2014</a:t>
             </a:fld>
             <a:endParaRPr lang="en-US"/>
           </a:p>
@@ -1300,7 +1300,7 @@
     </p:spTree>
     <p:extLst>
       <p:ext uri="{BB962C8B-B14F-4D97-AF65-F5344CB8AC3E}">
-        <p14:creationId xmlns:p14="http://schemas.microsoft.com/office/powerpoint/2010/main" xmlns="" val="1931434740"/>
+        <p14:creationId xmlns="" xmlns:p14="http://schemas.microsoft.com/office/powerpoint/2010/main" val="1931434740"/>
       </p:ext>
     </p:extLst>
   </p:cSld>
@@ -1617,7 +1617,7 @@
             <a:fld id="{57B3EDBD-9D3B-4136-9D70-FC66C9D4D47F}" type="datetimeFigureOut">
               <a:rPr lang="en-US" smtClean="0"/>
               <a:pPr/>
-              <a:t>10/7/2014</a:t>
+              <a:t>10/9/2014</a:t>
             </a:fld>
             <a:endParaRPr lang="en-US"/>
           </a:p>
@@ -1669,7 +1669,7 @@
     </p:spTree>
     <p:extLst>
       <p:ext uri="{BB962C8B-B14F-4D97-AF65-F5344CB8AC3E}">
-        <p14:creationId xmlns:p14="http://schemas.microsoft.com/office/powerpoint/2010/main" xmlns="" val="1296646791"/>
+        <p14:creationId xmlns="" xmlns:p14="http://schemas.microsoft.com/office/powerpoint/2010/main" val="1296646791"/>
       </p:ext>
     </p:extLst>
   </p:cSld>
@@ -1737,7 +1737,7 @@
             <a:fld id="{57B3EDBD-9D3B-4136-9D70-FC66C9D4D47F}" type="datetimeFigureOut">
               <a:rPr lang="en-US" smtClean="0"/>
               <a:pPr/>
-              <a:t>10/7/2014</a:t>
+              <a:t>10/9/2014</a:t>
             </a:fld>
             <a:endParaRPr lang="en-US"/>
           </a:p>
@@ -1789,7 +1789,7 @@
     </p:spTree>
     <p:extLst>
       <p:ext uri="{BB962C8B-B14F-4D97-AF65-F5344CB8AC3E}">
-        <p14:creationId xmlns:p14="http://schemas.microsoft.com/office/powerpoint/2010/main" xmlns="" val="556185585"/>
+        <p14:creationId xmlns="" xmlns:p14="http://schemas.microsoft.com/office/powerpoint/2010/main" val="556185585"/>
       </p:ext>
     </p:extLst>
   </p:cSld>
@@ -1834,7 +1834,7 @@
             <a:fld id="{57B3EDBD-9D3B-4136-9D70-FC66C9D4D47F}" type="datetimeFigureOut">
               <a:rPr lang="en-US" smtClean="0"/>
               <a:pPr/>
-              <a:t>10/7/2014</a:t>
+              <a:t>10/9/2014</a:t>
             </a:fld>
             <a:endParaRPr lang="en-US"/>
           </a:p>
@@ -1886,7 +1886,7 @@
     </p:spTree>
     <p:extLst>
       <p:ext uri="{BB962C8B-B14F-4D97-AF65-F5344CB8AC3E}">
-        <p14:creationId xmlns:p14="http://schemas.microsoft.com/office/powerpoint/2010/main" xmlns="" val="2428574185"/>
+        <p14:creationId xmlns="" xmlns:p14="http://schemas.microsoft.com/office/powerpoint/2010/main" val="2428574185"/>
       </p:ext>
     </p:extLst>
   </p:cSld>
@@ -2113,7 +2113,7 @@
             <a:fld id="{57B3EDBD-9D3B-4136-9D70-FC66C9D4D47F}" type="datetimeFigureOut">
               <a:rPr lang="en-US" smtClean="0"/>
               <a:pPr/>
-              <a:t>10/7/2014</a:t>
+              <a:t>10/9/2014</a:t>
             </a:fld>
             <a:endParaRPr lang="en-US"/>
           </a:p>
@@ -2165,7 +2165,7 @@
     </p:spTree>
     <p:extLst>
       <p:ext uri="{BB962C8B-B14F-4D97-AF65-F5344CB8AC3E}">
-        <p14:creationId xmlns:p14="http://schemas.microsoft.com/office/powerpoint/2010/main" xmlns="" val="4228434209"/>
+        <p14:creationId xmlns="" xmlns:p14="http://schemas.microsoft.com/office/powerpoint/2010/main" val="4228434209"/>
       </p:ext>
     </p:extLst>
   </p:cSld>
@@ -2368,7 +2368,7 @@
             <a:fld id="{57B3EDBD-9D3B-4136-9D70-FC66C9D4D47F}" type="datetimeFigureOut">
               <a:rPr lang="en-US" smtClean="0"/>
               <a:pPr/>
-              <a:t>10/7/2014</a:t>
+              <a:t>10/9/2014</a:t>
             </a:fld>
             <a:endParaRPr lang="en-US"/>
           </a:p>
@@ -2420,7 +2420,7 @@
     </p:spTree>
     <p:extLst>
       <p:ext uri="{BB962C8B-B14F-4D97-AF65-F5344CB8AC3E}">
-        <p14:creationId xmlns:p14="http://schemas.microsoft.com/office/powerpoint/2010/main" xmlns="" val="3446978262"/>
+        <p14:creationId xmlns="" xmlns:p14="http://schemas.microsoft.com/office/powerpoint/2010/main" val="3446978262"/>
       </p:ext>
     </p:extLst>
   </p:cSld>
@@ -2583,7 +2583,7 @@
             <a:fld id="{57B3EDBD-9D3B-4136-9D70-FC66C9D4D47F}" type="datetimeFigureOut">
               <a:rPr lang="en-US" smtClean="0"/>
               <a:pPr/>
-              <a:t>10/7/2014</a:t>
+              <a:t>10/9/2014</a:t>
             </a:fld>
             <a:endParaRPr lang="en-US"/>
           </a:p>
@@ -2671,7 +2671,7 @@
     </p:spTree>
     <p:extLst>
       <p:ext uri="{BB962C8B-B14F-4D97-AF65-F5344CB8AC3E}">
-        <p14:creationId xmlns:p14="http://schemas.microsoft.com/office/powerpoint/2010/main" xmlns="" val="521963650"/>
+        <p14:creationId xmlns="" xmlns:p14="http://schemas.microsoft.com/office/powerpoint/2010/main" val="521963650"/>
       </p:ext>
     </p:extLst>
   </p:cSld>
@@ -2996,47 +2996,48 @@
             <a:spLocks noGrp="1"/>
           </p:cNvSpPr>
           <p:nvPr>
-            <p:ph type="ctrTitle"/>
-          </p:nvPr>
-        </p:nvSpPr>
-        <p:spPr/>
-        <p:txBody>
-          <a:bodyPr/>
-          <a:lstStyle/>
-          <a:p>
-            <a:r>
-              <a:rPr lang="en-US" smtClean="0"/>
-              <a:t>Mark’s Slide</a:t>
-            </a:r>
-            <a:endParaRPr lang="en-US"/>
-          </a:p>
-        </p:txBody>
-      </p:sp>
-      <p:sp>
-        <p:nvSpPr>
-          <p:cNvPr id="3" name="Subtitle 2"/>
-          <p:cNvSpPr>
-            <a:spLocks noGrp="1"/>
-          </p:cNvSpPr>
-          <p:nvPr>
-            <p:ph type="subTitle" idx="1"/>
-          </p:nvPr>
-        </p:nvSpPr>
-        <p:spPr/>
-        <p:txBody>
-          <a:bodyPr/>
-          <a:lstStyle/>
-          <a:p>
-            <a:endParaRPr lang="en-US"/>
+            <p:ph type="title"/>
+          </p:nvPr>
+        </p:nvSpPr>
+        <p:spPr/>
+        <p:txBody>
+          <a:bodyPr/>
+          <a:lstStyle/>
+          <a:p>
+            <a:r>
+              <a:rPr lang="en-US" dirty="0" smtClean="0"/>
+              <a:t>Viewport</a:t>
+            </a:r>
+            <a:endParaRPr lang="en-US" dirty="0"/>
+          </a:p>
+        </p:txBody>
+      </p:sp>
+      <p:sp>
+        <p:nvSpPr>
+          <p:cNvPr id="3" name="Content Placeholder 2"/>
+          <p:cNvSpPr>
+            <a:spLocks noGrp="1"/>
+          </p:cNvSpPr>
+          <p:nvPr>
+            <p:ph idx="1"/>
+          </p:nvPr>
+        </p:nvSpPr>
+        <p:spPr/>
+        <p:txBody>
+          <a:bodyPr>
+            <a:normAutofit/>
+          </a:bodyPr>
+          <a:lstStyle/>
+          <a:p>
+            <a:r>
+              <a:rPr lang="en-US" sz="2400" dirty="0" smtClean="0"/>
+              <a:t>&lt;meta name=“viewport” content=“width=device-width, initial-scale=1”&gt;</a:t>
+            </a:r>
+            <a:endParaRPr lang="en-US" sz="2400" dirty="0"/>
           </a:p>
         </p:txBody>
       </p:sp>
     </p:spTree>
-    <p:extLst>
-      <p:ext uri="{BB962C8B-B14F-4D97-AF65-F5344CB8AC3E}">
-        <p14:creationId xmlns:p14="http://schemas.microsoft.com/office/powerpoint/2010/main" xmlns="" val="3182996200"/>
-      </p:ext>
-    </p:extLst>
   </p:cSld>
   <p:clrMapOvr>
     <a:masterClrMapping/>
@@ -3078,13 +3079,9 @@
           <a:p>
             <a:r>
               <a:rPr lang="en-US" dirty="0" smtClean="0"/>
-              <a:t>Mark’s </a:t>
-            </a:r>
-            <a:r>
-              <a:rPr lang="en-US" smtClean="0"/>
-              <a:t>Second Slide</a:t>
-            </a:r>
-            <a:endParaRPr lang="en-US"/>
+              <a:t>Reset CSS</a:t>
+            </a:r>
+            <a:endParaRPr lang="en-US" dirty="0"/>
           </a:p>
         </p:txBody>
       </p:sp>
@@ -3103,7 +3100,36 @@
           <a:bodyPr/>
           <a:lstStyle/>
           <a:p>
-            <a:endParaRPr lang="en-US"/>
+            <a:r>
+              <a:rPr lang="en-US" dirty="0" smtClean="0"/>
+              <a:t>I like to reset all </a:t>
+            </a:r>
+            <a:r>
+              <a:rPr lang="en-US" dirty="0" err="1" smtClean="0"/>
+              <a:t>css</a:t>
+            </a:r>
+            <a:r>
+              <a:rPr lang="en-US" dirty="0" smtClean="0"/>
+              <a:t>, so that I am in charge of margins, padding, etc.</a:t>
+            </a:r>
+          </a:p>
+          <a:p>
+            <a:r>
+              <a:rPr lang="en-US" dirty="0" smtClean="0"/>
+              <a:t>Popular reset </a:t>
+            </a:r>
+            <a:r>
+              <a:rPr lang="en-US" dirty="0" err="1" smtClean="0"/>
+              <a:t>css</a:t>
+            </a:r>
+            <a:r>
+              <a:rPr lang="en-US" dirty="0" smtClean="0"/>
+              <a:t> can </a:t>
+            </a:r>
+            <a:r>
+              <a:rPr lang="en-US" dirty="0" smtClean="0"/>
+              <a:t>be found at: http://www.cssreset.com/</a:t>
+            </a:r>
           </a:p>
         </p:txBody>
       </p:sp>
@@ -3370,7 +3396,7 @@
   <a:extraClrSchemeLst/>
   <a:extLst>
     <a:ext uri="{05A4C25C-085E-4340-85A3-A5531E510DB2}">
-      <thm15:themeFamily xmlns:thm15="http://schemas.microsoft.com/office/thememl/2012/main" xmlns="" name="Office Theme" id="{62F939B6-93AF-4DB8-9C6B-D6C7DFDC589F}" vid="{4A3C46E8-61CC-4603-A589-7422A47A8E4A}"/>
+      <thm15:themeFamily xmlns="" xmlns:thm15="http://schemas.microsoft.com/office/thememl/2012/main" name="Office Theme" id="{62F939B6-93AF-4DB8-9C6B-D6C7DFDC589F}" vid="{4A3C46E8-61CC-4603-A589-7422A47A8E4A}"/>
     </a:ext>
   </a:extLst>
 </a:theme>

</xml_diff>

<commit_message>
added more slides and added routes
</commit_message>
<xml_diff>
--- a/presentation/ResponsiveWebDesign.pptx
+++ b/presentation/ResponsiveWebDesign.pptx
@@ -7,6 +7,8 @@
   <p:sldIdLst>
     <p:sldId id="257" r:id="rId2"/>
     <p:sldId id="258" r:id="rId3"/>
+    <p:sldId id="259" r:id="rId4"/>
+    <p:sldId id="260" r:id="rId5"/>
   </p:sldIdLst>
   <p:sldSz cx="12192000" cy="6858000"/>
   <p:notesSz cx="6858000" cy="9144000"/>
@@ -105,6 +107,22 @@
       </a:defRPr>
     </a:lvl9pPr>
   </p:defaultTextStyle>
+  <p:extLst>
+    <p:ext uri="{EFAFB233-063F-42B5-8137-9DF3F51BA10A}">
+      <p15:sldGuideLst xmlns:p15="http://schemas.microsoft.com/office/powerpoint/2012/main">
+        <p15:guide id="1" orient="horz" pos="2160">
+          <p15:clr>
+            <a:srgbClr val="A4A3A4"/>
+          </p15:clr>
+        </p15:guide>
+        <p15:guide id="2" pos="3840">
+          <p15:clr>
+            <a:srgbClr val="A4A3A4"/>
+          </p15:clr>
+        </p15:guide>
+      </p15:sldGuideLst>
+    </p:ext>
+  </p:extLst>
 </p:presentation>
 </file>
 
@@ -292,7 +310,7 @@
     </p:spTree>
     <p:extLst>
       <p:ext uri="{BB962C8B-B14F-4D97-AF65-F5344CB8AC3E}">
-        <p14:creationId xmlns="" xmlns:p14="http://schemas.microsoft.com/office/powerpoint/2010/main" val="603690990"/>
+        <p14:creationId xmlns:p14="http://schemas.microsoft.com/office/powerpoint/2010/main" val="603690990"/>
       </p:ext>
     </p:extLst>
   </p:cSld>
@@ -464,7 +482,7 @@
     </p:spTree>
     <p:extLst>
       <p:ext uri="{BB962C8B-B14F-4D97-AF65-F5344CB8AC3E}">
-        <p14:creationId xmlns="" xmlns:p14="http://schemas.microsoft.com/office/powerpoint/2010/main" val="289908853"/>
+        <p14:creationId xmlns:p14="http://schemas.microsoft.com/office/powerpoint/2010/main" val="289908853"/>
       </p:ext>
     </p:extLst>
   </p:cSld>
@@ -646,7 +664,7 @@
     </p:spTree>
     <p:extLst>
       <p:ext uri="{BB962C8B-B14F-4D97-AF65-F5344CB8AC3E}">
-        <p14:creationId xmlns="" xmlns:p14="http://schemas.microsoft.com/office/powerpoint/2010/main" val="192542277"/>
+        <p14:creationId xmlns:p14="http://schemas.microsoft.com/office/powerpoint/2010/main" val="192542277"/>
       </p:ext>
     </p:extLst>
   </p:cSld>
@@ -818,7 +836,7 @@
     </p:spTree>
     <p:extLst>
       <p:ext uri="{BB962C8B-B14F-4D97-AF65-F5344CB8AC3E}">
-        <p14:creationId xmlns="" xmlns:p14="http://schemas.microsoft.com/office/powerpoint/2010/main" val="2085885461"/>
+        <p14:creationId xmlns:p14="http://schemas.microsoft.com/office/powerpoint/2010/main" val="2085885461"/>
       </p:ext>
     </p:extLst>
   </p:cSld>
@@ -1066,7 +1084,7 @@
     </p:spTree>
     <p:extLst>
       <p:ext uri="{BB962C8B-B14F-4D97-AF65-F5344CB8AC3E}">
-        <p14:creationId xmlns="" xmlns:p14="http://schemas.microsoft.com/office/powerpoint/2010/main" val="3778703531"/>
+        <p14:creationId xmlns:p14="http://schemas.microsoft.com/office/powerpoint/2010/main" val="3778703531"/>
       </p:ext>
     </p:extLst>
   </p:cSld>
@@ -1300,7 +1318,7 @@
     </p:spTree>
     <p:extLst>
       <p:ext uri="{BB962C8B-B14F-4D97-AF65-F5344CB8AC3E}">
-        <p14:creationId xmlns="" xmlns:p14="http://schemas.microsoft.com/office/powerpoint/2010/main" val="1931434740"/>
+        <p14:creationId xmlns:p14="http://schemas.microsoft.com/office/powerpoint/2010/main" val="1931434740"/>
       </p:ext>
     </p:extLst>
   </p:cSld>
@@ -1669,7 +1687,7 @@
     </p:spTree>
     <p:extLst>
       <p:ext uri="{BB962C8B-B14F-4D97-AF65-F5344CB8AC3E}">
-        <p14:creationId xmlns="" xmlns:p14="http://schemas.microsoft.com/office/powerpoint/2010/main" val="1296646791"/>
+        <p14:creationId xmlns:p14="http://schemas.microsoft.com/office/powerpoint/2010/main" val="1296646791"/>
       </p:ext>
     </p:extLst>
   </p:cSld>
@@ -1789,7 +1807,7 @@
     </p:spTree>
     <p:extLst>
       <p:ext uri="{BB962C8B-B14F-4D97-AF65-F5344CB8AC3E}">
-        <p14:creationId xmlns="" xmlns:p14="http://schemas.microsoft.com/office/powerpoint/2010/main" val="556185585"/>
+        <p14:creationId xmlns:p14="http://schemas.microsoft.com/office/powerpoint/2010/main" val="556185585"/>
       </p:ext>
     </p:extLst>
   </p:cSld>
@@ -1886,7 +1904,7 @@
     </p:spTree>
     <p:extLst>
       <p:ext uri="{BB962C8B-B14F-4D97-AF65-F5344CB8AC3E}">
-        <p14:creationId xmlns="" xmlns:p14="http://schemas.microsoft.com/office/powerpoint/2010/main" val="2428574185"/>
+        <p14:creationId xmlns:p14="http://schemas.microsoft.com/office/powerpoint/2010/main" val="2428574185"/>
       </p:ext>
     </p:extLst>
   </p:cSld>
@@ -2165,7 +2183,7 @@
     </p:spTree>
     <p:extLst>
       <p:ext uri="{BB962C8B-B14F-4D97-AF65-F5344CB8AC3E}">
-        <p14:creationId xmlns="" xmlns:p14="http://schemas.microsoft.com/office/powerpoint/2010/main" val="4228434209"/>
+        <p14:creationId xmlns:p14="http://schemas.microsoft.com/office/powerpoint/2010/main" val="4228434209"/>
       </p:ext>
     </p:extLst>
   </p:cSld>
@@ -2420,7 +2438,7 @@
     </p:spTree>
     <p:extLst>
       <p:ext uri="{BB962C8B-B14F-4D97-AF65-F5344CB8AC3E}">
-        <p14:creationId xmlns="" xmlns:p14="http://schemas.microsoft.com/office/powerpoint/2010/main" val="3446978262"/>
+        <p14:creationId xmlns:p14="http://schemas.microsoft.com/office/powerpoint/2010/main" val="3446978262"/>
       </p:ext>
     </p:extLst>
   </p:cSld>
@@ -2671,7 +2689,7 @@
     </p:spTree>
     <p:extLst>
       <p:ext uri="{BB962C8B-B14F-4D97-AF65-F5344CB8AC3E}">
-        <p14:creationId xmlns="" xmlns:p14="http://schemas.microsoft.com/office/powerpoint/2010/main" val="521963650"/>
+        <p14:creationId xmlns:p14="http://schemas.microsoft.com/office/powerpoint/2010/main" val="521963650"/>
       </p:ext>
     </p:extLst>
   </p:cSld>
@@ -3124,16 +3142,197 @@
             </a:r>
             <a:r>
               <a:rPr lang="en-US" dirty="0" smtClean="0"/>
-              <a:t> can </a:t>
-            </a:r>
+              <a:t> can be found at: http://www.cssreset.com/</a:t>
+            </a:r>
+          </a:p>
+        </p:txBody>
+      </p:sp>
+    </p:spTree>
+  </p:cSld>
+  <p:clrMapOvr>
+    <a:masterClrMapping/>
+  </p:clrMapOvr>
+</p:sld>
+</file>
+
+<file path=ppt/slides/slide3.xml><?xml version="1.0" encoding="utf-8"?>
+<p:sld xmlns:a="http://schemas.openxmlformats.org/drawingml/2006/main" xmlns:r="http://schemas.openxmlformats.org/officeDocument/2006/relationships" xmlns:p="http://schemas.openxmlformats.org/presentationml/2006/main">
+  <p:cSld>
+    <p:spTree>
+      <p:nvGrpSpPr>
+        <p:cNvPr id="1" name=""/>
+        <p:cNvGrpSpPr/>
+        <p:nvPr/>
+      </p:nvGrpSpPr>
+      <p:grpSpPr>
+        <a:xfrm>
+          <a:off x="0" y="0"/>
+          <a:ext cx="0" cy="0"/>
+          <a:chOff x="0" y="0"/>
+          <a:chExt cx="0" cy="0"/>
+        </a:xfrm>
+      </p:grpSpPr>
+      <p:sp>
+        <p:nvSpPr>
+          <p:cNvPr id="2" name="Title 1"/>
+          <p:cNvSpPr>
+            <a:spLocks noGrp="1"/>
+          </p:cNvSpPr>
+          <p:nvPr>
+            <p:ph type="title"/>
+          </p:nvPr>
+        </p:nvSpPr>
+        <p:spPr/>
+        <p:txBody>
+          <a:bodyPr/>
+          <a:lstStyle/>
+          <a:p>
             <a:r>
               <a:rPr lang="en-US" dirty="0" smtClean="0"/>
-              <a:t>be found at: http://www.cssreset.com/</a:t>
-            </a:r>
+              <a:t>Media Queries</a:t>
+            </a:r>
+            <a:endParaRPr lang="en-US" dirty="0"/>
+          </a:p>
+        </p:txBody>
+      </p:sp>
+      <p:sp>
+        <p:nvSpPr>
+          <p:cNvPr id="3" name="Content Placeholder 2"/>
+          <p:cNvSpPr>
+            <a:spLocks noGrp="1"/>
+          </p:cNvSpPr>
+          <p:nvPr>
+            <p:ph idx="1"/>
+          </p:nvPr>
+        </p:nvSpPr>
+        <p:spPr/>
+        <p:txBody>
+          <a:bodyPr/>
+          <a:lstStyle/>
+          <a:p>
+            <a:r>
+              <a:rPr lang="en-US" dirty="0" smtClean="0"/>
+              <a:t>@media screen and (min-width: 321px) and (max-width: 480px) { }</a:t>
+            </a:r>
+            <a:endParaRPr lang="en-US" dirty="0"/>
           </a:p>
         </p:txBody>
       </p:sp>
     </p:spTree>
+    <p:extLst>
+      <p:ext uri="{BB962C8B-B14F-4D97-AF65-F5344CB8AC3E}">
+        <p14:creationId xmlns:p14="http://schemas.microsoft.com/office/powerpoint/2010/main" val="4204333805"/>
+      </p:ext>
+    </p:extLst>
+  </p:cSld>
+  <p:clrMapOvr>
+    <a:masterClrMapping/>
+  </p:clrMapOvr>
+</p:sld>
+</file>
+
+<file path=ppt/slides/slide4.xml><?xml version="1.0" encoding="utf-8"?>
+<p:sld xmlns:a="http://schemas.openxmlformats.org/drawingml/2006/main" xmlns:r="http://schemas.openxmlformats.org/officeDocument/2006/relationships" xmlns:p="http://schemas.openxmlformats.org/presentationml/2006/main">
+  <p:cSld>
+    <p:spTree>
+      <p:nvGrpSpPr>
+        <p:cNvPr id="1" name=""/>
+        <p:cNvGrpSpPr/>
+        <p:nvPr/>
+      </p:nvGrpSpPr>
+      <p:grpSpPr>
+        <a:xfrm>
+          <a:off x="0" y="0"/>
+          <a:ext cx="0" cy="0"/>
+          <a:chOff x="0" y="0"/>
+          <a:chExt cx="0" cy="0"/>
+        </a:xfrm>
+      </p:grpSpPr>
+      <p:sp>
+        <p:nvSpPr>
+          <p:cNvPr id="2" name="Title 1"/>
+          <p:cNvSpPr>
+            <a:spLocks noGrp="1"/>
+          </p:cNvSpPr>
+          <p:nvPr>
+            <p:ph type="title"/>
+          </p:nvPr>
+        </p:nvSpPr>
+        <p:spPr/>
+        <p:txBody>
+          <a:bodyPr/>
+          <a:lstStyle/>
+          <a:p>
+            <a:r>
+              <a:rPr lang="en-US" dirty="0" smtClean="0"/>
+              <a:t>&lt;picture&gt;</a:t>
+            </a:r>
+            <a:endParaRPr lang="en-US" dirty="0"/>
+          </a:p>
+        </p:txBody>
+      </p:sp>
+      <p:sp>
+        <p:nvSpPr>
+          <p:cNvPr id="3" name="Content Placeholder 2"/>
+          <p:cNvSpPr>
+            <a:spLocks noGrp="1"/>
+          </p:cNvSpPr>
+          <p:nvPr>
+            <p:ph idx="1"/>
+          </p:nvPr>
+        </p:nvSpPr>
+        <p:spPr/>
+        <p:txBody>
+          <a:bodyPr/>
+          <a:lstStyle/>
+          <a:p>
+            <a:r>
+              <a:rPr lang="en-US" dirty="0" smtClean="0"/>
+              <a:t>Proposed responsive image tag.</a:t>
+            </a:r>
+          </a:p>
+          <a:p>
+            <a:r>
+              <a:rPr lang="en-US" dirty="0" smtClean="0"/>
+              <a:t>&lt;picture&gt;</a:t>
+            </a:r>
+            <a:r>
+              <a:rPr lang="en-US" dirty="0"/>
+              <a:t/>
+            </a:r>
+            <a:br>
+              <a:rPr lang="en-US" dirty="0"/>
+            </a:br>
+            <a:r>
+              <a:rPr lang="en-US" dirty="0" smtClean="0"/>
+              <a:t>	&lt;source</a:t>
+            </a:r>
+            <a:br>
+              <a:rPr lang="en-US" dirty="0" smtClean="0"/>
+            </a:br>
+            <a:r>
+              <a:rPr lang="en-US" dirty="0" smtClean="0"/>
+              <a:t>&lt;/picture&gt;</a:t>
+            </a:r>
+          </a:p>
+          <a:p>
+            <a:r>
+              <a:rPr lang="en-US" dirty="0" err="1" smtClean="0"/>
+              <a:t>Polyfill</a:t>
+            </a:r>
+            <a:r>
+              <a:rPr lang="en-US" dirty="0"/>
+              <a:t> at: https://github.com/scottjehl/picturefill</a:t>
+            </a:r>
+          </a:p>
+        </p:txBody>
+      </p:sp>
+    </p:spTree>
+    <p:extLst>
+      <p:ext uri="{BB962C8B-B14F-4D97-AF65-F5344CB8AC3E}">
+        <p14:creationId xmlns:p14="http://schemas.microsoft.com/office/powerpoint/2010/main" val="2184689531"/>
+      </p:ext>
+    </p:extLst>
   </p:cSld>
   <p:clrMapOvr>
     <a:masterClrMapping/>
@@ -3396,7 +3595,7 @@
   <a:extraClrSchemeLst/>
   <a:extLst>
     <a:ext uri="{05A4C25C-085E-4340-85A3-A5531E510DB2}">
-      <thm15:themeFamily xmlns="" xmlns:thm15="http://schemas.microsoft.com/office/thememl/2012/main" name="Office Theme" id="{62F939B6-93AF-4DB8-9C6B-D6C7DFDC589F}" vid="{4A3C46E8-61CC-4603-A589-7422A47A8E4A}"/>
+      <thm15:themeFamily xmlns:thm15="http://schemas.microsoft.com/office/thememl/2012/main" name="Office Theme" id="{62F939B6-93AF-4DB8-9C6B-D6C7DFDC589F}" vid="{4A3C46E8-61CC-4603-A589-7422A47A8E4A}"/>
     </a:ext>
   </a:extLst>
 </a:theme>

</xml_diff>

<commit_message>
added resource slide for article on probs with rwd
</commit_message>
<xml_diff>
--- a/presentation/ResponsiveWebDesign.pptx
+++ b/presentation/ResponsiveWebDesign.pptx
@@ -9,6 +9,7 @@
     <p:sldId id="258" r:id="rId3"/>
     <p:sldId id="259" r:id="rId4"/>
     <p:sldId id="260" r:id="rId5"/>
+    <p:sldId id="261" r:id="rId6"/>
   </p:sldIdLst>
   <p:sldSz cx="12192000" cy="6858000"/>
   <p:notesSz cx="6858000" cy="9144000"/>
@@ -3439,6 +3440,84 @@
 </p:sld>
 </file>
 
+<file path=ppt/slides/slide5.xml><?xml version="1.0" encoding="utf-8"?>
+<p:sld xmlns:a="http://schemas.openxmlformats.org/drawingml/2006/main" xmlns:r="http://schemas.openxmlformats.org/officeDocument/2006/relationships" xmlns:p="http://schemas.openxmlformats.org/presentationml/2006/main">
+  <p:cSld>
+    <p:spTree>
+      <p:nvGrpSpPr>
+        <p:cNvPr id="1" name=""/>
+        <p:cNvGrpSpPr/>
+        <p:nvPr/>
+      </p:nvGrpSpPr>
+      <p:grpSpPr>
+        <a:xfrm>
+          <a:off x="0" y="0"/>
+          <a:ext cx="0" cy="0"/>
+          <a:chOff x="0" y="0"/>
+          <a:chExt cx="0" cy="0"/>
+        </a:xfrm>
+      </p:grpSpPr>
+      <p:sp>
+        <p:nvSpPr>
+          <p:cNvPr id="2" name="Title 1"/>
+          <p:cNvSpPr>
+            <a:spLocks noGrp="1"/>
+          </p:cNvSpPr>
+          <p:nvPr>
+            <p:ph type="title"/>
+          </p:nvPr>
+        </p:nvSpPr>
+        <p:spPr/>
+        <p:txBody>
+          <a:bodyPr/>
+          <a:lstStyle/>
+          <a:p>
+            <a:r>
+              <a:rPr lang="en-US" dirty="0" smtClean="0"/>
+              <a:t>Problems with RWD</a:t>
+            </a:r>
+            <a:endParaRPr lang="en-US" dirty="0"/>
+          </a:p>
+        </p:txBody>
+      </p:sp>
+      <p:sp>
+        <p:nvSpPr>
+          <p:cNvPr id="3" name="Content Placeholder 2"/>
+          <p:cNvSpPr>
+            <a:spLocks noGrp="1"/>
+          </p:cNvSpPr>
+          <p:nvPr>
+            <p:ph idx="1"/>
+          </p:nvPr>
+        </p:nvSpPr>
+        <p:spPr/>
+        <p:txBody>
+          <a:bodyPr>
+            <a:normAutofit/>
+          </a:bodyPr>
+          <a:lstStyle/>
+          <a:p>
+            <a:pPr lvl="1"/>
+            <a:r>
+              <a:rPr lang="en-US" dirty="0"/>
+              <a:t>http://www.creativebloq.com/responsive-web-design/problems-8122790</a:t>
+            </a:r>
+          </a:p>
+        </p:txBody>
+      </p:sp>
+    </p:spTree>
+    <p:extLst>
+      <p:ext uri="{BB962C8B-B14F-4D97-AF65-F5344CB8AC3E}">
+        <p14:creationId xmlns:p14="http://schemas.microsoft.com/office/powerpoint/2010/main" val="212909026"/>
+      </p:ext>
+    </p:extLst>
+  </p:cSld>
+  <p:clrMapOvr>
+    <a:masterClrMapping/>
+  </p:clrMapOvr>
+</p:sld>
+</file>
+
 <file path=ppt/theme/theme1.xml><?xml version="1.0" encoding="utf-8"?>
 <a:theme xmlns:a="http://schemas.openxmlformats.org/drawingml/2006/main" name="Office Theme">
   <a:themeElements>

</xml_diff>

<commit_message>
yet more slides. added lab 3
</commit_message>
<xml_diff>
--- a/presentation/ResponsiveWebDesign.pptx
+++ b/presentation/ResponsiveWebDesign.pptx
@@ -22,7 +22,9 @@
     <p:sldId id="276" r:id="rId16"/>
     <p:sldId id="277" r:id="rId17"/>
     <p:sldId id="260" r:id="rId18"/>
-    <p:sldId id="261" r:id="rId19"/>
+    <p:sldId id="279" r:id="rId19"/>
+    <p:sldId id="278" r:id="rId20"/>
+    <p:sldId id="261" r:id="rId21"/>
   </p:sldIdLst>
   <p:sldSz cx="12192000" cy="6858000"/>
   <p:notesSz cx="6858000" cy="9144000"/>
@@ -3707,11 +3709,7 @@
             <a:pPr lvl="1"/>
             <a:r>
               <a:rPr lang="en-US" dirty="0" smtClean="0"/>
-              <a:t>This is especially important </a:t>
-            </a:r>
-            <a:r>
-              <a:rPr lang="en-US" smtClean="0"/>
-              <a:t>with images.</a:t>
+              <a:t>This is especially important with images.</a:t>
             </a:r>
             <a:endParaRPr lang="en-US" dirty="0"/>
           </a:p>
@@ -4118,7 +4116,7 @@
           <a:p>
             <a:r>
               <a:rPr lang="en-US" dirty="0" smtClean="0"/>
-              <a:t>Problems with RWD</a:t>
+              <a:t>LAB 3: Picture Fill</a:t>
             </a:r>
             <a:endParaRPr lang="en-US" dirty="0"/>
           </a:p>
@@ -4136,23 +4134,265 @@
         </p:nvSpPr>
         <p:spPr/>
         <p:txBody>
-          <a:bodyPr>
-            <a:normAutofit/>
-          </a:bodyPr>
-          <a:lstStyle/>
-          <a:p>
-            <a:pPr lvl="1"/>
-            <a:r>
-              <a:rPr lang="en-US" dirty="0"/>
-              <a:t>http://www.creativebloq.com/responsive-web-design/problems-8122790</a:t>
-            </a:r>
+          <a:bodyPr/>
+          <a:lstStyle/>
+          <a:p>
+            <a:r>
+              <a:rPr lang="en-US" dirty="0" smtClean="0"/>
+              <a:t>Go to </a:t>
+            </a:r>
+            <a:r>
+              <a:rPr lang="en-US" dirty="0" err="1" smtClean="0"/>
+              <a:t>github</a:t>
+            </a:r>
+            <a:r>
+              <a:rPr lang="en-US" dirty="0" smtClean="0"/>
+              <a:t> and get the </a:t>
+            </a:r>
+            <a:r>
+              <a:rPr lang="en-US" dirty="0" err="1" smtClean="0"/>
+              <a:t>picturefill</a:t>
+            </a:r>
+            <a:r>
+              <a:rPr lang="en-US" dirty="0" smtClean="0"/>
+              <a:t> </a:t>
+            </a:r>
+            <a:r>
+              <a:rPr lang="en-US" dirty="0" err="1" smtClean="0"/>
+              <a:t>polyfill</a:t>
+            </a:r>
+            <a:r>
+              <a:rPr lang="en-US" dirty="0" smtClean="0"/>
+              <a:t>.</a:t>
+            </a:r>
+          </a:p>
+          <a:p>
+            <a:r>
+              <a:rPr lang="en-US" dirty="0" smtClean="0"/>
+              <a:t>Add it to the project</a:t>
+            </a:r>
+          </a:p>
+          <a:p>
+            <a:r>
+              <a:rPr lang="en-US" dirty="0" smtClean="0"/>
+              <a:t>Add a couple of different image files and set up the </a:t>
+            </a:r>
+            <a:r>
+              <a:rPr lang="en-US" dirty="0" err="1" smtClean="0"/>
+              <a:t>polyfill</a:t>
+            </a:r>
+            <a:r>
+              <a:rPr lang="en-US" dirty="0" smtClean="0"/>
+              <a:t> to swap out, depending on breakpoints.</a:t>
+            </a:r>
+          </a:p>
+          <a:p>
+            <a:r>
+              <a:rPr lang="en-US" dirty="0" smtClean="0"/>
+              <a:t>Use Chrome </a:t>
+            </a:r>
+            <a:r>
+              <a:rPr lang="en-US" dirty="0" err="1" smtClean="0"/>
+              <a:t>dev</a:t>
+            </a:r>
+            <a:r>
+              <a:rPr lang="en-US" dirty="0" smtClean="0"/>
+              <a:t> tools to emulate devices and to monitor net traffic to see that resources </a:t>
+            </a:r>
+            <a:r>
+              <a:rPr lang="en-US" smtClean="0"/>
+              <a:t>are efficiently used.</a:t>
+            </a:r>
+            <a:endParaRPr lang="en-US" dirty="0" smtClean="0"/>
           </a:p>
         </p:txBody>
       </p:sp>
     </p:spTree>
     <p:extLst>
       <p:ext uri="{BB962C8B-B14F-4D97-AF65-F5344CB8AC3E}">
-        <p14:creationId xmlns:p14="http://schemas.microsoft.com/office/powerpoint/2010/main" val="212909026"/>
+        <p14:creationId xmlns:p14="http://schemas.microsoft.com/office/powerpoint/2010/main" val="3557553001"/>
+      </p:ext>
+    </p:extLst>
+  </p:cSld>
+  <p:clrMapOvr>
+    <a:masterClrMapping/>
+  </p:clrMapOvr>
+</p:sld>
+</file>
+
+<file path=ppt/slides/slide19.xml><?xml version="1.0" encoding="utf-8"?>
+<p:sld xmlns:a="http://schemas.openxmlformats.org/drawingml/2006/main" xmlns:r="http://schemas.openxmlformats.org/officeDocument/2006/relationships" xmlns:p="http://schemas.openxmlformats.org/presentationml/2006/main">
+  <p:cSld>
+    <p:spTree>
+      <p:nvGrpSpPr>
+        <p:cNvPr id="1" name=""/>
+        <p:cNvGrpSpPr/>
+        <p:nvPr/>
+      </p:nvGrpSpPr>
+      <p:grpSpPr>
+        <a:xfrm>
+          <a:off x="0" y="0"/>
+          <a:ext cx="0" cy="0"/>
+          <a:chOff x="0" y="0"/>
+          <a:chExt cx="0" cy="0"/>
+        </a:xfrm>
+      </p:grpSpPr>
+      <p:sp>
+        <p:nvSpPr>
+          <p:cNvPr id="2" name="Title 1"/>
+          <p:cNvSpPr>
+            <a:spLocks noGrp="1"/>
+          </p:cNvSpPr>
+          <p:nvPr>
+            <p:ph type="title"/>
+          </p:nvPr>
+        </p:nvSpPr>
+        <p:spPr/>
+        <p:txBody>
+          <a:bodyPr/>
+          <a:lstStyle/>
+          <a:p>
+            <a:r>
+              <a:rPr lang="en-US" dirty="0" smtClean="0"/>
+              <a:t>Icon bar	</a:t>
+            </a:r>
+            <a:endParaRPr lang="en-US" dirty="0"/>
+          </a:p>
+        </p:txBody>
+      </p:sp>
+      <p:sp>
+        <p:nvSpPr>
+          <p:cNvPr id="3" name="Content Placeholder 2"/>
+          <p:cNvSpPr>
+            <a:spLocks noGrp="1"/>
+          </p:cNvSpPr>
+          <p:nvPr>
+            <p:ph idx="1"/>
+          </p:nvPr>
+        </p:nvSpPr>
+        <p:spPr/>
+        <p:txBody>
+          <a:bodyPr/>
+          <a:lstStyle/>
+          <a:p>
+            <a:r>
+              <a:rPr lang="en-US" dirty="0" smtClean="0"/>
+              <a:t>For the </a:t>
+            </a:r>
+            <a:r>
+              <a:rPr lang="en-US" dirty="0"/>
+              <a:t>collapse to work</a:t>
+            </a:r>
+            <a:r>
+              <a:rPr lang="en-US" dirty="0" smtClean="0"/>
+              <a:t>:</a:t>
+            </a:r>
+          </a:p>
+          <a:p>
+            <a:pPr marL="914400" lvl="1" indent="-457200">
+              <a:buFont typeface="+mj-lt"/>
+              <a:buAutoNum type="arabicPeriod"/>
+            </a:pPr>
+            <a:r>
+              <a:rPr lang="en-US" dirty="0" smtClean="0"/>
+              <a:t>button </a:t>
+            </a:r>
+            <a:r>
+              <a:rPr lang="en-US" dirty="0"/>
+              <a:t>with class </a:t>
+            </a:r>
+            <a:r>
+              <a:rPr lang="en-US" dirty="0" err="1"/>
+              <a:t>navbar</a:t>
+            </a:r>
+            <a:r>
+              <a:rPr lang="en-US" dirty="0"/>
+              <a:t>-toggle</a:t>
+            </a:r>
+          </a:p>
+          <a:p>
+            <a:pPr marL="914400" lvl="1" indent="-457200">
+              <a:buFont typeface="+mj-lt"/>
+              <a:buAutoNum type="arabicPeriod"/>
+            </a:pPr>
+            <a:r>
+              <a:rPr lang="en-US" dirty="0" smtClean="0"/>
+              <a:t>within </a:t>
+            </a:r>
+            <a:r>
+              <a:rPr lang="en-US" dirty="0" err="1"/>
+              <a:t>navbar</a:t>
+            </a:r>
+            <a:r>
+              <a:rPr lang="en-US" dirty="0"/>
+              <a:t>-header</a:t>
+            </a:r>
+          </a:p>
+          <a:p>
+            <a:pPr marL="914400" lvl="1" indent="-457200">
+              <a:buFont typeface="+mj-lt"/>
+              <a:buAutoNum type="arabicPeriod"/>
+            </a:pPr>
+            <a:r>
+              <a:rPr lang="en-US" dirty="0" smtClean="0"/>
+              <a:t>within </a:t>
+            </a:r>
+            <a:r>
+              <a:rPr lang="en-US" dirty="0" err="1"/>
+              <a:t>navbar</a:t>
+            </a:r>
+            <a:r>
+              <a:rPr lang="en-US" dirty="0"/>
+              <a:t> </a:t>
+            </a:r>
+            <a:r>
+              <a:rPr lang="en-US" dirty="0" err="1"/>
+              <a:t>navbar</a:t>
+            </a:r>
+            <a:r>
+              <a:rPr lang="en-US" dirty="0"/>
+              <a:t>-default</a:t>
+            </a:r>
+          </a:p>
+          <a:p>
+            <a:pPr marL="914400" lvl="1" indent="-457200">
+              <a:buFont typeface="+mj-lt"/>
+              <a:buAutoNum type="arabicPeriod"/>
+            </a:pPr>
+            <a:r>
+              <a:rPr lang="en-US" dirty="0" smtClean="0"/>
+              <a:t>for </a:t>
+            </a:r>
+            <a:r>
+              <a:rPr lang="en-US" dirty="0"/>
+              <a:t>the menu to right just and be cool </a:t>
+            </a:r>
+            <a:r>
+              <a:rPr lang="en-US" dirty="0" err="1"/>
+              <a:t>navbar-nav</a:t>
+            </a:r>
+            <a:r>
+              <a:rPr lang="en-US" dirty="0"/>
+              <a:t> </a:t>
+            </a:r>
+            <a:r>
+              <a:rPr lang="en-US" dirty="0" err="1"/>
+              <a:t>navbar</a:t>
+            </a:r>
+            <a:r>
+              <a:rPr lang="en-US" dirty="0"/>
+              <a:t>-right</a:t>
+            </a:r>
+          </a:p>
+          <a:p>
+            <a:endParaRPr lang="en-US" dirty="0"/>
+          </a:p>
+        </p:txBody>
+      </p:sp>
+    </p:spTree>
+    <p:extLst>
+      <p:ext uri="{BB962C8B-B14F-4D97-AF65-F5344CB8AC3E}">
+        <p14:creationId xmlns:p14="http://schemas.microsoft.com/office/powerpoint/2010/main" val="1106414729"/>
       </p:ext>
     </p:extLst>
   </p:cSld>
@@ -4259,6 +4499,84 @@
     <p:extLst>
       <p:ext uri="{BB962C8B-B14F-4D97-AF65-F5344CB8AC3E}">
         <p14:creationId xmlns:p14="http://schemas.microsoft.com/office/powerpoint/2010/main" val="3922520670"/>
+      </p:ext>
+    </p:extLst>
+  </p:cSld>
+  <p:clrMapOvr>
+    <a:masterClrMapping/>
+  </p:clrMapOvr>
+</p:sld>
+</file>
+
+<file path=ppt/slides/slide20.xml><?xml version="1.0" encoding="utf-8"?>
+<p:sld xmlns:a="http://schemas.openxmlformats.org/drawingml/2006/main" xmlns:r="http://schemas.openxmlformats.org/officeDocument/2006/relationships" xmlns:p="http://schemas.openxmlformats.org/presentationml/2006/main">
+  <p:cSld>
+    <p:spTree>
+      <p:nvGrpSpPr>
+        <p:cNvPr id="1" name=""/>
+        <p:cNvGrpSpPr/>
+        <p:nvPr/>
+      </p:nvGrpSpPr>
+      <p:grpSpPr>
+        <a:xfrm>
+          <a:off x="0" y="0"/>
+          <a:ext cx="0" cy="0"/>
+          <a:chOff x="0" y="0"/>
+          <a:chExt cx="0" cy="0"/>
+        </a:xfrm>
+      </p:grpSpPr>
+      <p:sp>
+        <p:nvSpPr>
+          <p:cNvPr id="2" name="Title 1"/>
+          <p:cNvSpPr>
+            <a:spLocks noGrp="1"/>
+          </p:cNvSpPr>
+          <p:nvPr>
+            <p:ph type="title"/>
+          </p:nvPr>
+        </p:nvSpPr>
+        <p:spPr/>
+        <p:txBody>
+          <a:bodyPr/>
+          <a:lstStyle/>
+          <a:p>
+            <a:r>
+              <a:rPr lang="en-US" dirty="0" smtClean="0"/>
+              <a:t>Problems with RWD</a:t>
+            </a:r>
+            <a:endParaRPr lang="en-US" dirty="0"/>
+          </a:p>
+        </p:txBody>
+      </p:sp>
+      <p:sp>
+        <p:nvSpPr>
+          <p:cNvPr id="3" name="Content Placeholder 2"/>
+          <p:cNvSpPr>
+            <a:spLocks noGrp="1"/>
+          </p:cNvSpPr>
+          <p:nvPr>
+            <p:ph idx="1"/>
+          </p:nvPr>
+        </p:nvSpPr>
+        <p:spPr/>
+        <p:txBody>
+          <a:bodyPr>
+            <a:normAutofit/>
+          </a:bodyPr>
+          <a:lstStyle/>
+          <a:p>
+            <a:pPr lvl="1"/>
+            <a:r>
+              <a:rPr lang="en-US" dirty="0"/>
+              <a:t>http://www.creativebloq.com/responsive-web-design/problems-8122790</a:t>
+            </a:r>
+          </a:p>
+        </p:txBody>
+      </p:sp>
+    </p:spTree>
+    <p:extLst>
+      <p:ext uri="{BB962C8B-B14F-4D97-AF65-F5344CB8AC3E}">
+        <p14:creationId xmlns:p14="http://schemas.microsoft.com/office/powerpoint/2010/main" val="212909026"/>
       </p:ext>
     </p:extLst>
   </p:cSld>

</xml_diff>

<commit_message>
more slides. lab 4
</commit_message>
<xml_diff>
--- a/presentation/ResponsiveWebDesign.pptx
+++ b/presentation/ResponsiveWebDesign.pptx
@@ -23,8 +23,10 @@
     <p:sldId id="277" r:id="rId17"/>
     <p:sldId id="260" r:id="rId18"/>
     <p:sldId id="279" r:id="rId19"/>
-    <p:sldId id="278" r:id="rId20"/>
-    <p:sldId id="261" r:id="rId21"/>
+    <p:sldId id="280" r:id="rId20"/>
+    <p:sldId id="281" r:id="rId21"/>
+    <p:sldId id="278" r:id="rId22"/>
+    <p:sldId id="261" r:id="rId23"/>
   </p:sldIdLst>
   <p:sldSz cx="12192000" cy="6858000"/>
   <p:notesSz cx="6858000" cy="9144000"/>
@@ -4197,13 +4199,8 @@
             </a:r>
             <a:r>
               <a:rPr lang="en-US" dirty="0" smtClean="0"/>
-              <a:t> tools to emulate devices and to monitor net traffic to see that resources </a:t>
-            </a:r>
-            <a:r>
-              <a:rPr lang="en-US" smtClean="0"/>
-              <a:t>are efficiently used.</a:t>
-            </a:r>
-            <a:endParaRPr lang="en-US" dirty="0" smtClean="0"/>
+              <a:t> tools to emulate devices and to monitor net traffic to see that resources are efficiently used.</a:t>
+            </a:r>
           </a:p>
         </p:txBody>
       </p:sp>
@@ -4254,7 +4251,7 @@
           <a:p>
             <a:r>
               <a:rPr lang="en-US" dirty="0" smtClean="0"/>
-              <a:t>Icon bar	</a:t>
+              <a:t>Skeleton</a:t>
             </a:r>
             <a:endParaRPr lang="en-US" dirty="0"/>
           </a:p>
@@ -4277,122 +4274,37 @@
           <a:p>
             <a:r>
               <a:rPr lang="en-US" dirty="0" smtClean="0"/>
-              <a:t>For the </a:t>
-            </a:r>
-            <a:r>
-              <a:rPr lang="en-US" dirty="0"/>
-              <a:t>collapse to work</a:t>
-            </a:r>
-            <a:r>
-              <a:rPr lang="en-US" dirty="0" smtClean="0"/>
-              <a:t>:</a:t>
-            </a:r>
-          </a:p>
-          <a:p>
-            <a:pPr marL="914400" lvl="1" indent="-457200">
-              <a:buFont typeface="+mj-lt"/>
-              <a:buAutoNum type="arabicPeriod"/>
-            </a:pPr>
-            <a:r>
-              <a:rPr lang="en-US" dirty="0" smtClean="0"/>
-              <a:t>button </a:t>
-            </a:r>
-            <a:r>
-              <a:rPr lang="en-US" dirty="0"/>
-              <a:t>with class </a:t>
-            </a:r>
-            <a:r>
-              <a:rPr lang="en-US" dirty="0" err="1"/>
-              <a:t>navbar</a:t>
-            </a:r>
-            <a:r>
-              <a:rPr lang="en-US" dirty="0"/>
-              <a:t>-toggle</a:t>
-            </a:r>
-          </a:p>
-          <a:p>
-            <a:pPr marL="914400" lvl="1" indent="-457200">
-              <a:buFont typeface="+mj-lt"/>
-              <a:buAutoNum type="arabicPeriod"/>
-            </a:pPr>
-            <a:r>
-              <a:rPr lang="en-US" dirty="0" smtClean="0"/>
-              <a:t>within </a:t>
-            </a:r>
-            <a:r>
-              <a:rPr lang="en-US" dirty="0" err="1"/>
-              <a:t>navbar</a:t>
-            </a:r>
-            <a:r>
-              <a:rPr lang="en-US" dirty="0"/>
-              <a:t>-header</a:t>
-            </a:r>
-          </a:p>
-          <a:p>
-            <a:pPr marL="914400" lvl="1" indent="-457200">
-              <a:buFont typeface="+mj-lt"/>
-              <a:buAutoNum type="arabicPeriod"/>
-            </a:pPr>
-            <a:r>
-              <a:rPr lang="en-US" dirty="0" smtClean="0"/>
-              <a:t>within </a:t>
-            </a:r>
-            <a:r>
-              <a:rPr lang="en-US" dirty="0" err="1"/>
-              <a:t>navbar</a:t>
-            </a:r>
-            <a:r>
-              <a:rPr lang="en-US" dirty="0"/>
-              <a:t> </a:t>
-            </a:r>
-            <a:r>
-              <a:rPr lang="en-US" dirty="0" err="1"/>
-              <a:t>navbar</a:t>
-            </a:r>
-            <a:r>
-              <a:rPr lang="en-US" dirty="0"/>
-              <a:t>-default</a:t>
-            </a:r>
-          </a:p>
-          <a:p>
-            <a:pPr marL="914400" lvl="1" indent="-457200">
-              <a:buFont typeface="+mj-lt"/>
-              <a:buAutoNum type="arabicPeriod"/>
-            </a:pPr>
-            <a:r>
-              <a:rPr lang="en-US" dirty="0" smtClean="0"/>
-              <a:t>for </a:t>
-            </a:r>
-            <a:r>
-              <a:rPr lang="en-US" dirty="0"/>
-              <a:t>the menu to right just and be cool </a:t>
-            </a:r>
-            <a:r>
-              <a:rPr lang="en-US" dirty="0" err="1"/>
-              <a:t>navbar-nav</a:t>
-            </a:r>
-            <a:r>
-              <a:rPr lang="en-US" dirty="0"/>
-              <a:t> </a:t>
-            </a:r>
-            <a:r>
-              <a:rPr lang="en-US" dirty="0" err="1"/>
-              <a:t>navbar</a:t>
-            </a:r>
-            <a:r>
-              <a:rPr lang="en-US" dirty="0"/>
-              <a:t>-right</a:t>
-            </a:r>
-          </a:p>
-          <a:p>
-            <a:endParaRPr lang="en-US" dirty="0"/>
+              <a:t>Skeleton is a responsive grid.</a:t>
+            </a:r>
+          </a:p>
+          <a:p>
+            <a:r>
+              <a:rPr lang="en-US" dirty="0" smtClean="0"/>
+              <a:t>Consider this if you want a totally lightweight responsive framework.</a:t>
+            </a:r>
+          </a:p>
+          <a:p>
+            <a:r>
+              <a:rPr lang="en-US" dirty="0" smtClean="0"/>
+              <a:t>Get it at: </a:t>
+            </a:r>
+            <a:r>
+              <a:rPr lang="en-US" dirty="0" smtClean="0">
+                <a:hlinkClick r:id="rId2"/>
+              </a:rPr>
+              <a:t>http://getskeleton.com</a:t>
+            </a:r>
+            <a:endParaRPr lang="en-US" dirty="0" smtClean="0"/>
+          </a:p>
+          <a:p>
+            <a:endParaRPr lang="en-US" dirty="0" smtClean="0"/>
           </a:p>
         </p:txBody>
       </p:sp>
     </p:spTree>
     <p:extLst>
       <p:ext uri="{BB962C8B-B14F-4D97-AF65-F5344CB8AC3E}">
-        <p14:creationId xmlns:p14="http://schemas.microsoft.com/office/powerpoint/2010/main" val="1106414729"/>
+        <p14:creationId xmlns:p14="http://schemas.microsoft.com/office/powerpoint/2010/main" val="504528449"/>
       </p:ext>
     </p:extLst>
   </p:cSld>
@@ -4509,6 +4421,284 @@
 </file>
 
 <file path=ppt/slides/slide20.xml><?xml version="1.0" encoding="utf-8"?>
+<p:sld xmlns:a="http://schemas.openxmlformats.org/drawingml/2006/main" xmlns:r="http://schemas.openxmlformats.org/officeDocument/2006/relationships" xmlns:p="http://schemas.openxmlformats.org/presentationml/2006/main">
+  <p:cSld>
+    <p:spTree>
+      <p:nvGrpSpPr>
+        <p:cNvPr id="1" name=""/>
+        <p:cNvGrpSpPr/>
+        <p:nvPr/>
+      </p:nvGrpSpPr>
+      <p:grpSpPr>
+        <a:xfrm>
+          <a:off x="0" y="0"/>
+          <a:ext cx="0" cy="0"/>
+          <a:chOff x="0" y="0"/>
+          <a:chExt cx="0" cy="0"/>
+        </a:xfrm>
+      </p:grpSpPr>
+      <p:sp>
+        <p:nvSpPr>
+          <p:cNvPr id="2" name="Title 1"/>
+          <p:cNvSpPr>
+            <a:spLocks noGrp="1"/>
+          </p:cNvSpPr>
+          <p:nvPr>
+            <p:ph type="title"/>
+          </p:nvPr>
+        </p:nvSpPr>
+        <p:spPr/>
+        <p:txBody>
+          <a:bodyPr/>
+          <a:lstStyle/>
+          <a:p>
+            <a:r>
+              <a:rPr lang="en-US" dirty="0" smtClean="0"/>
+              <a:t>LAB 4: Update 960 grid to Skeleton</a:t>
+            </a:r>
+            <a:endParaRPr lang="en-US" dirty="0"/>
+          </a:p>
+        </p:txBody>
+      </p:sp>
+      <p:sp>
+        <p:nvSpPr>
+          <p:cNvPr id="3" name="Content Placeholder 2"/>
+          <p:cNvSpPr>
+            <a:spLocks noGrp="1"/>
+          </p:cNvSpPr>
+          <p:nvPr>
+            <p:ph idx="1"/>
+          </p:nvPr>
+        </p:nvSpPr>
+        <p:spPr/>
+        <p:txBody>
+          <a:bodyPr/>
+          <a:lstStyle/>
+          <a:p>
+            <a:r>
+              <a:rPr lang="en-US" dirty="0" smtClean="0"/>
+              <a:t>Update project with skeleton</a:t>
+            </a:r>
+          </a:p>
+          <a:p>
+            <a:r>
+              <a:rPr lang="en-US" dirty="0" smtClean="0"/>
+              <a:t>Update DOM to reference</a:t>
+            </a:r>
+          </a:p>
+          <a:p>
+            <a:r>
+              <a:rPr lang="en-US" dirty="0" smtClean="0"/>
+              <a:t>Test in responsive tools in Chrome </a:t>
+            </a:r>
+            <a:r>
+              <a:rPr lang="en-US" dirty="0" err="1" smtClean="0"/>
+              <a:t>dev</a:t>
+            </a:r>
+            <a:r>
+              <a:rPr lang="en-US" smtClean="0"/>
+              <a:t> tools.</a:t>
+            </a:r>
+            <a:endParaRPr lang="en-US"/>
+          </a:p>
+        </p:txBody>
+      </p:sp>
+    </p:spTree>
+    <p:extLst>
+      <p:ext uri="{BB962C8B-B14F-4D97-AF65-F5344CB8AC3E}">
+        <p14:creationId xmlns:p14="http://schemas.microsoft.com/office/powerpoint/2010/main" val="3811336391"/>
+      </p:ext>
+    </p:extLst>
+  </p:cSld>
+  <p:clrMapOvr>
+    <a:masterClrMapping/>
+  </p:clrMapOvr>
+</p:sld>
+</file>
+
+<file path=ppt/slides/slide21.xml><?xml version="1.0" encoding="utf-8"?>
+<p:sld xmlns:a="http://schemas.openxmlformats.org/drawingml/2006/main" xmlns:r="http://schemas.openxmlformats.org/officeDocument/2006/relationships" xmlns:p="http://schemas.openxmlformats.org/presentationml/2006/main">
+  <p:cSld>
+    <p:spTree>
+      <p:nvGrpSpPr>
+        <p:cNvPr id="1" name=""/>
+        <p:cNvGrpSpPr/>
+        <p:nvPr/>
+      </p:nvGrpSpPr>
+      <p:grpSpPr>
+        <a:xfrm>
+          <a:off x="0" y="0"/>
+          <a:ext cx="0" cy="0"/>
+          <a:chOff x="0" y="0"/>
+          <a:chExt cx="0" cy="0"/>
+        </a:xfrm>
+      </p:grpSpPr>
+      <p:sp>
+        <p:nvSpPr>
+          <p:cNvPr id="2" name="Title 1"/>
+          <p:cNvSpPr>
+            <a:spLocks noGrp="1"/>
+          </p:cNvSpPr>
+          <p:nvPr>
+            <p:ph type="title"/>
+          </p:nvPr>
+        </p:nvSpPr>
+        <p:spPr/>
+        <p:txBody>
+          <a:bodyPr/>
+          <a:lstStyle/>
+          <a:p>
+            <a:r>
+              <a:rPr lang="en-US" dirty="0" smtClean="0"/>
+              <a:t>Icon bar	</a:t>
+            </a:r>
+            <a:endParaRPr lang="en-US" dirty="0"/>
+          </a:p>
+        </p:txBody>
+      </p:sp>
+      <p:sp>
+        <p:nvSpPr>
+          <p:cNvPr id="3" name="Content Placeholder 2"/>
+          <p:cNvSpPr>
+            <a:spLocks noGrp="1"/>
+          </p:cNvSpPr>
+          <p:nvPr>
+            <p:ph idx="1"/>
+          </p:nvPr>
+        </p:nvSpPr>
+        <p:spPr/>
+        <p:txBody>
+          <a:bodyPr/>
+          <a:lstStyle/>
+          <a:p>
+            <a:r>
+              <a:rPr lang="en-US" dirty="0" smtClean="0"/>
+              <a:t>For the </a:t>
+            </a:r>
+            <a:r>
+              <a:rPr lang="en-US" dirty="0"/>
+              <a:t>collapse to work</a:t>
+            </a:r>
+            <a:r>
+              <a:rPr lang="en-US" dirty="0" smtClean="0"/>
+              <a:t>:</a:t>
+            </a:r>
+          </a:p>
+          <a:p>
+            <a:pPr marL="914400" lvl="1" indent="-457200">
+              <a:buFont typeface="+mj-lt"/>
+              <a:buAutoNum type="arabicPeriod"/>
+            </a:pPr>
+            <a:r>
+              <a:rPr lang="en-US" dirty="0" smtClean="0"/>
+              <a:t>button </a:t>
+            </a:r>
+            <a:r>
+              <a:rPr lang="en-US" dirty="0"/>
+              <a:t>with class </a:t>
+            </a:r>
+            <a:r>
+              <a:rPr lang="en-US" dirty="0" err="1"/>
+              <a:t>navbar</a:t>
+            </a:r>
+            <a:r>
+              <a:rPr lang="en-US" dirty="0"/>
+              <a:t>-toggle</a:t>
+            </a:r>
+          </a:p>
+          <a:p>
+            <a:pPr marL="914400" lvl="1" indent="-457200">
+              <a:buFont typeface="+mj-lt"/>
+              <a:buAutoNum type="arabicPeriod"/>
+            </a:pPr>
+            <a:r>
+              <a:rPr lang="en-US" dirty="0" smtClean="0"/>
+              <a:t>within </a:t>
+            </a:r>
+            <a:r>
+              <a:rPr lang="en-US" dirty="0" err="1"/>
+              <a:t>navbar</a:t>
+            </a:r>
+            <a:r>
+              <a:rPr lang="en-US" dirty="0"/>
+              <a:t>-header</a:t>
+            </a:r>
+          </a:p>
+          <a:p>
+            <a:pPr marL="914400" lvl="1" indent="-457200">
+              <a:buFont typeface="+mj-lt"/>
+              <a:buAutoNum type="arabicPeriod"/>
+            </a:pPr>
+            <a:r>
+              <a:rPr lang="en-US" dirty="0" smtClean="0"/>
+              <a:t>within </a:t>
+            </a:r>
+            <a:r>
+              <a:rPr lang="en-US" dirty="0" err="1"/>
+              <a:t>navbar</a:t>
+            </a:r>
+            <a:r>
+              <a:rPr lang="en-US" dirty="0"/>
+              <a:t> </a:t>
+            </a:r>
+            <a:r>
+              <a:rPr lang="en-US" dirty="0" err="1"/>
+              <a:t>navbar</a:t>
+            </a:r>
+            <a:r>
+              <a:rPr lang="en-US" dirty="0"/>
+              <a:t>-default</a:t>
+            </a:r>
+          </a:p>
+          <a:p>
+            <a:pPr marL="914400" lvl="1" indent="-457200">
+              <a:buFont typeface="+mj-lt"/>
+              <a:buAutoNum type="arabicPeriod"/>
+            </a:pPr>
+            <a:r>
+              <a:rPr lang="en-US" dirty="0" smtClean="0"/>
+              <a:t>for </a:t>
+            </a:r>
+            <a:r>
+              <a:rPr lang="en-US" dirty="0"/>
+              <a:t>the menu to right just and be cool </a:t>
+            </a:r>
+            <a:r>
+              <a:rPr lang="en-US" dirty="0" err="1"/>
+              <a:t>navbar-nav</a:t>
+            </a:r>
+            <a:r>
+              <a:rPr lang="en-US" dirty="0"/>
+              <a:t> </a:t>
+            </a:r>
+            <a:r>
+              <a:rPr lang="en-US" dirty="0" err="1"/>
+              <a:t>navbar</a:t>
+            </a:r>
+            <a:r>
+              <a:rPr lang="en-US" dirty="0"/>
+              <a:t>-right</a:t>
+            </a:r>
+          </a:p>
+          <a:p>
+            <a:endParaRPr lang="en-US" dirty="0"/>
+          </a:p>
+        </p:txBody>
+      </p:sp>
+    </p:spTree>
+    <p:extLst>
+      <p:ext uri="{BB962C8B-B14F-4D97-AF65-F5344CB8AC3E}">
+        <p14:creationId xmlns:p14="http://schemas.microsoft.com/office/powerpoint/2010/main" val="1106414729"/>
+      </p:ext>
+    </p:extLst>
+  </p:cSld>
+  <p:clrMapOvr>
+    <a:masterClrMapping/>
+  </p:clrMapOvr>
+</p:sld>
+</file>
+
+<file path=ppt/slides/slide22.xml><?xml version="1.0" encoding="utf-8"?>
 <p:sld xmlns:a="http://schemas.openxmlformats.org/drawingml/2006/main" xmlns:r="http://schemas.openxmlformats.org/officeDocument/2006/relationships" xmlns:p="http://schemas.openxmlformats.org/presentationml/2006/main">
   <p:cSld>
     <p:spTree>

</xml_diff>